<commit_message>
Adding in some figures and committing latest changes.
</commit_message>
<xml_diff>
--- a/slides/tst_november2017_update.pptx
+++ b/slides/tst_november2017_update.pptx
@@ -8,9 +8,10 @@
     <p:sldId id="262" r:id="rId2"/>
     <p:sldId id="261" r:id="rId3"/>
     <p:sldId id="256" r:id="rId4"/>
-    <p:sldId id="257" r:id="rId5"/>
-    <p:sldId id="258" r:id="rId6"/>
-    <p:sldId id="259" r:id="rId7"/>
+    <p:sldId id="263" r:id="rId5"/>
+    <p:sldId id="257" r:id="rId6"/>
+    <p:sldId id="258" r:id="rId7"/>
+    <p:sldId id="259" r:id="rId8"/>
   </p:sldIdLst>
   <p:sldSz cx="12192000" cy="6858000"/>
   <p:notesSz cx="6858000" cy="9144000"/>
@@ -115,6 +116,10 @@
     </p:ext>
   </p:extLst>
 </p:presentation>
+</file>
+
+<file path=ppt/revisionInfo.xml><?xml version="1.0" encoding="utf-8"?>
+<p1510:revInfo xmlns:a="http://schemas.openxmlformats.org/drawingml/2006/main" xmlns:r="http://schemas.openxmlformats.org/officeDocument/2006/relationships" xmlns:p1510="http://schemas.microsoft.com/office/powerpoint/2015/10/main"/>
 </file>
 
 <file path=ppt/slideLayouts/slideLayout1.xml><?xml version="1.0" encoding="utf-8"?>
@@ -2971,13 +2976,15 @@
         </p:nvSpPr>
         <p:spPr/>
         <p:txBody>
-          <a:bodyPr/>
+          <a:bodyPr>
+            <a:normAutofit fontScale="90000"/>
+          </a:bodyPr>
           <a:lstStyle/>
           <a:p>
             <a:pPr algn="ctr"/>
             <a:r>
               <a:rPr lang="en-US" dirty="0"/>
-              <a:t>GPU work for Global Halos</a:t>
+              <a:t>Global Halos - Avoiding Duplicated Halo Data in GPU Memory </a:t>
             </a:r>
             <a:br>
               <a:rPr lang="en-US" dirty="0"/>
@@ -3004,19 +3011,23 @@
         </p:nvSpPr>
         <p:spPr>
           <a:xfrm>
-            <a:off x="838200" y="1825625"/>
-            <a:ext cx="5022954" cy="4351338"/>
+            <a:off x="359229" y="1825625"/>
+            <a:ext cx="6307662" cy="4351338"/>
           </a:xfrm>
         </p:spPr>
         <p:txBody>
           <a:bodyPr>
-            <a:normAutofit lnSpcReduction="10000"/>
+            <a:normAutofit/>
           </a:bodyPr>
           <a:lstStyle/>
           <a:p>
             <a:r>
               <a:rPr lang="en-US" dirty="0"/>
-              <a:t>Applies when halo data fully encompasses neighbor simulation variables.</a:t>
+              <a:t>Scenario: </a:t>
+            </a:r>
+            <a:r>
+              <a:rPr lang="en-US" i="1" dirty="0"/>
+              <a:t>Large halos fully encompasses adjacent neighbor patches.</a:t>
             </a:r>
           </a:p>
           <a:p>
@@ -3038,11 +3049,19 @@
             </a:r>
             <a:r>
               <a:rPr lang="en-US" b="1" dirty="0"/>
-              <a:t>avoids duplication of halo data</a:t>
-            </a:r>
-            <a:r>
-              <a:rPr lang="en-US" dirty="0"/>
-              <a:t>.  Memory usage significantly reduced.     </a:t>
+              <a:t>Avoids duplication of halo data</a:t>
+            </a:r>
+            <a:r>
+              <a:rPr lang="en-US" dirty="0"/>
+              <a:t>.  </a:t>
+            </a:r>
+            <a:r>
+              <a:rPr lang="en-US" b="1" dirty="0"/>
+              <a:t>Memory usage significantly reduced</a:t>
+            </a:r>
+            <a:r>
+              <a:rPr lang="en-US" dirty="0"/>
+              <a:t>.     </a:t>
             </a:r>
           </a:p>
           <a:p>
@@ -3050,6 +3069,42 @@
           </a:p>
         </p:txBody>
       </p:sp>
+      <p:pic>
+        <p:nvPicPr>
+          <p:cNvPr id="5" name="Picture 4" descr="A screenshot of a cell phone screen with text&#10;&#10;Description generated with very high confidence">
+            <a:extLst>
+              <a:ext uri="{FF2B5EF4-FFF2-40B4-BE49-F238E27FC236}">
+                <a16:creationId xmlns:a16="http://schemas.microsoft.com/office/drawing/2014/main" id="{064E86EB-C694-40FD-A34F-0CAFAEC4A28F}"/>
+              </a:ext>
+            </a:extLst>
+          </p:cNvPr>
+          <p:cNvPicPr>
+            <a:picLocks noChangeAspect="1"/>
+          </p:cNvPicPr>
+          <p:nvPr/>
+        </p:nvPicPr>
+        <p:blipFill>
+          <a:blip r:embed="rId2">
+            <a:extLst>
+              <a:ext uri="{28A0092B-C50C-407E-A947-70E740481C1C}">
+                <a14:useLocalDpi xmlns:a14="http://schemas.microsoft.com/office/drawing/2010/main" val="0"/>
+              </a:ext>
+            </a:extLst>
+          </a:blip>
+          <a:stretch>
+            <a:fillRect/>
+          </a:stretch>
+        </p:blipFill>
+        <p:spPr>
+          <a:xfrm>
+            <a:off x="6914989" y="1690688"/>
+            <a:ext cx="4539055" cy="4486275"/>
+          </a:xfrm>
+          <a:prstGeom prst="rect">
+            <a:avLst/>
+          </a:prstGeom>
+        </p:spPr>
+      </p:pic>
     </p:spTree>
     <p:extLst>
       <p:ext uri="{BB962C8B-B14F-4D97-AF65-F5344CB8AC3E}">
@@ -3141,7 +3196,7 @@
         <p:spPr>
           <a:xfrm>
             <a:off x="298383" y="1825625"/>
-            <a:ext cx="5101389" cy="4351338"/>
+            <a:ext cx="5362188" cy="4351338"/>
           </a:xfrm>
         </p:spPr>
         <p:txBody>
@@ -3151,12 +3206,16 @@
           <a:lstStyle/>
           <a:p>
             <a:r>
+              <a:rPr lang="en-US" dirty="0"/>
+              <a:t>Goal is to use </a:t>
+            </a:r>
+            <a:r>
               <a:rPr lang="en-US" dirty="0" err="1"/>
               <a:t>Kokkos</a:t>
             </a:r>
             <a:r>
               <a:rPr lang="en-US" dirty="0"/>
-              <a:t> provides fantastic code portability. </a:t>
+              <a:t> for code portability.</a:t>
             </a:r>
           </a:p>
           <a:p>
@@ -3170,13 +3229,20 @@
             </a:r>
             <a:r>
               <a:rPr lang="en-US" dirty="0"/>
-              <a:t> managed memory tools as Uintah already handles data coherency and task concurrency in its data stores.  </a:t>
-            </a:r>
-          </a:p>
-          <a:p>
-            <a:r>
-              <a:rPr lang="en-US" dirty="0"/>
-              <a:t>Implementation of Uintah with </a:t>
+              <a:t> managed memory tools.</a:t>
+            </a:r>
+          </a:p>
+          <a:p>
+            <a:pPr lvl="1"/>
+            <a:r>
+              <a:rPr lang="en-US" dirty="0"/>
+              <a:t>We already handle data coherency and task concurrency.</a:t>
+            </a:r>
+          </a:p>
+          <a:p>
+            <a:r>
+              <a:rPr lang="en-US" dirty="0"/>
+              <a:t>Additional work required to fully utilize </a:t>
             </a:r>
             <a:r>
               <a:rPr lang="en-US" dirty="0" err="1"/>
@@ -3184,7 +3250,7 @@
             </a:r>
             <a:r>
               <a:rPr lang="en-US" dirty="0"/>
-              <a:t> for GPUs and for Xeon Phis requires additional work.</a:t>
+              <a:t> with Uintah for GPUs and Xeon Phis.</a:t>
             </a:r>
           </a:p>
           <a:p>
@@ -3197,10 +3263,10 @@
       </p:sp>
       <p:pic>
         <p:nvPicPr>
-          <p:cNvPr id="6" name="Picture 5" descr="A screenshot of a cell phone&#10;&#10;Description generated with very high confidence">
+          <p:cNvPr id="5" name="Picture 4" descr="A screenshot of a cell phone&#10;&#10;Description generated with very high confidence">
             <a:extLst>
               <a:ext uri="{FF2B5EF4-FFF2-40B4-BE49-F238E27FC236}">
-                <a16:creationId xmlns:a16="http://schemas.microsoft.com/office/drawing/2014/main" id="{357DFF51-1CD2-45AF-8D35-04DE8393EBC5}"/>
+                <a16:creationId xmlns:a16="http://schemas.microsoft.com/office/drawing/2014/main" id="{22D0CF60-D135-4EB1-AB6F-CDF34F18180B}"/>
               </a:ext>
             </a:extLst>
           </p:cNvPr>
@@ -3223,8 +3289,8 @@
         </p:blipFill>
         <p:spPr>
           <a:xfrm>
-            <a:off x="6502489" y="1267692"/>
-            <a:ext cx="4851311" cy="5056698"/>
+            <a:off x="6248400" y="1267692"/>
+            <a:ext cx="4953000" cy="5056187"/>
           </a:xfrm>
           <a:prstGeom prst="rect">
             <a:avLst/>
@@ -3378,7 +3444,7 @@
             </a:r>
             <a:r>
               <a:rPr lang="en-US" dirty="0"/>
-              <a:t> info placed into GPU Constant Cache Memory and executed</a:t>
+              <a:t> info placed into GPU Constant Cache Memory and executed.</a:t>
             </a:r>
           </a:p>
           <a:p>
@@ -3472,6 +3538,167 @@
           <p:cNvPr id="2" name="Title 1">
             <a:extLst>
               <a:ext uri="{FF2B5EF4-FFF2-40B4-BE49-F238E27FC236}">
+                <a16:creationId xmlns:a16="http://schemas.microsoft.com/office/drawing/2014/main" id="{FC178837-2DA2-4D87-BFDB-A38FDC3BF875}"/>
+              </a:ext>
+            </a:extLst>
+          </p:cNvPr>
+          <p:cNvSpPr>
+            <a:spLocks noGrp="1"/>
+          </p:cNvSpPr>
+          <p:nvPr>
+            <p:ph type="title"/>
+          </p:nvPr>
+        </p:nvSpPr>
+        <p:spPr/>
+        <p:txBody>
+          <a:bodyPr/>
+          <a:lstStyle/>
+          <a:p>
+            <a:pPr algn="ctr"/>
+            <a:r>
+              <a:rPr lang="en-US" dirty="0"/>
+              <a:t>Current </a:t>
+            </a:r>
+            <a:r>
+              <a:rPr lang="en-US" dirty="0" err="1"/>
+              <a:t>Kokkos</a:t>
+            </a:r>
+            <a:r>
+              <a:rPr lang="en-US" dirty="0"/>
+              <a:t> – Serialized GPU Execution</a:t>
+            </a:r>
+          </a:p>
+        </p:txBody>
+      </p:sp>
+      <p:sp>
+        <p:nvSpPr>
+          <p:cNvPr id="3" name="Content Placeholder 2">
+            <a:extLst>
+              <a:ext uri="{FF2B5EF4-FFF2-40B4-BE49-F238E27FC236}">
+                <a16:creationId xmlns:a16="http://schemas.microsoft.com/office/drawing/2014/main" id="{28FB873D-09D7-4AA0-BD97-F00AE8B6A9A4}"/>
+              </a:ext>
+            </a:extLst>
+          </p:cNvPr>
+          <p:cNvSpPr>
+            <a:spLocks noGrp="1"/>
+          </p:cNvSpPr>
+          <p:nvPr>
+            <p:ph idx="1"/>
+          </p:nvPr>
+        </p:nvSpPr>
+        <p:spPr>
+          <a:xfrm>
+            <a:off x="838199" y="3995056"/>
+            <a:ext cx="10047515" cy="2375763"/>
+          </a:xfrm>
+        </p:spPr>
+        <p:txBody>
+          <a:bodyPr>
+            <a:normAutofit/>
+          </a:bodyPr>
+          <a:lstStyle/>
+          <a:p>
+            <a:r>
+              <a:rPr lang="en-US" sz="3200" dirty="0"/>
+              <a:t>Only one </a:t>
+            </a:r>
+            <a:r>
+              <a:rPr lang="en-US" sz="3200" dirty="0" err="1"/>
+              <a:t>Kokkos</a:t>
+            </a:r>
+            <a:r>
+              <a:rPr lang="en-US" sz="3200" dirty="0"/>
+              <a:t> </a:t>
+            </a:r>
+            <a:r>
+              <a:rPr lang="en-US" sz="3200" dirty="0" err="1"/>
+              <a:t>functor</a:t>
+            </a:r>
+            <a:r>
+              <a:rPr lang="en-US" sz="3200" dirty="0"/>
+              <a:t> can be executed at a time.  </a:t>
+            </a:r>
+          </a:p>
+          <a:p>
+            <a:pPr lvl="1"/>
+            <a:r>
+              <a:rPr lang="en-US" sz="2800" dirty="0"/>
+              <a:t>This makes it difficult to properly fill target GPU!  </a:t>
+            </a:r>
+          </a:p>
+          <a:p>
+            <a:r>
+              <a:rPr lang="en-US" sz="3200" dirty="0"/>
+              <a:t>Uintah has many smaller GPU tasks.  We need asynchrony to execute tasks and to fill a GPU.</a:t>
+            </a:r>
+          </a:p>
+        </p:txBody>
+      </p:sp>
+      <p:pic>
+        <p:nvPicPr>
+          <p:cNvPr id="5" name="Picture 4">
+            <a:extLst>
+              <a:ext uri="{FF2B5EF4-FFF2-40B4-BE49-F238E27FC236}">
+                <a16:creationId xmlns:a16="http://schemas.microsoft.com/office/drawing/2014/main" id="{3C8279FF-B250-4B7E-BF51-E4873CC58020}"/>
+              </a:ext>
+            </a:extLst>
+          </p:cNvPr>
+          <p:cNvPicPr>
+            <a:picLocks noChangeAspect="1"/>
+          </p:cNvPicPr>
+          <p:nvPr/>
+        </p:nvPicPr>
+        <p:blipFill>
+          <a:blip r:embed="rId2"/>
+          <a:stretch>
+            <a:fillRect/>
+          </a:stretch>
+        </p:blipFill>
+        <p:spPr>
+          <a:xfrm>
+            <a:off x="1627461" y="1578213"/>
+            <a:ext cx="9133020" cy="2255746"/>
+          </a:xfrm>
+          <a:prstGeom prst="rect">
+            <a:avLst/>
+          </a:prstGeom>
+        </p:spPr>
+      </p:pic>
+    </p:spTree>
+    <p:extLst>
+      <p:ext uri="{BB962C8B-B14F-4D97-AF65-F5344CB8AC3E}">
+        <p14:creationId xmlns:p14="http://schemas.microsoft.com/office/powerpoint/2010/main" val="1522255733"/>
+      </p:ext>
+    </p:extLst>
+  </p:cSld>
+  <p:clrMapOvr>
+    <a:masterClrMapping/>
+  </p:clrMapOvr>
+</p:sld>
+</file>
+
+<file path=ppt/slides/slide5.xml><?xml version="1.0" encoding="utf-8"?>
+<p:sld xmlns:a="http://schemas.openxmlformats.org/drawingml/2006/main" xmlns:r="http://schemas.openxmlformats.org/officeDocument/2006/relationships" xmlns:p="http://schemas.openxmlformats.org/presentationml/2006/main">
+  <p:cSld>
+    <p:spTree>
+      <p:nvGrpSpPr>
+        <p:cNvPr id="1" name=""/>
+        <p:cNvGrpSpPr/>
+        <p:nvPr/>
+      </p:nvGrpSpPr>
+      <p:grpSpPr>
+        <a:xfrm>
+          <a:off x="0" y="0"/>
+          <a:ext cx="0" cy="0"/>
+          <a:chOff x="0" y="0"/>
+          <a:chExt cx="0" cy="0"/>
+        </a:xfrm>
+      </p:grpSpPr>
+      <p:sp>
+        <p:nvSpPr>
+          <p:cNvPr id="2" name="Title 1">
+            <a:extLst>
+              <a:ext uri="{FF2B5EF4-FFF2-40B4-BE49-F238E27FC236}">
                 <a16:creationId xmlns:a16="http://schemas.microsoft.com/office/drawing/2014/main" id="{21C22538-0E26-4D0C-934D-C7871F35ABA4}"/>
               </a:ext>
             </a:extLst>
@@ -3636,7 +3863,7 @@
 </p:sld>
 </file>
 
-<file path=ppt/slides/slide5.xml><?xml version="1.0" encoding="utf-8"?>
+<file path=ppt/slides/slide6.xml><?xml version="1.0" encoding="utf-8"?>
 <p:sld xmlns:a="http://schemas.openxmlformats.org/drawingml/2006/main" xmlns:r="http://schemas.openxmlformats.org/officeDocument/2006/relationships" xmlns:p="http://schemas.openxmlformats.org/presentationml/2006/main">
   <p:cSld>
     <p:spTree>
@@ -3690,7 +3917,7 @@
             </a:r>
             <a:r>
               <a:rPr lang="en-US" dirty="0"/>
-              <a:t> Results</a:t>
+              <a:t> Asynchrony Results </a:t>
             </a:r>
           </a:p>
         </p:txBody>
@@ -3858,7 +4085,7 @@
 </p:sld>
 </file>
 
-<file path=ppt/slides/slide6.xml><?xml version="1.0" encoding="utf-8"?>
+<file path=ppt/slides/slide7.xml><?xml version="1.0" encoding="utf-8"?>
 <p:sld xmlns:a="http://schemas.openxmlformats.org/drawingml/2006/main" xmlns:r="http://schemas.openxmlformats.org/officeDocument/2006/relationships" xmlns:p="http://schemas.openxmlformats.org/presentationml/2006/main">
   <p:cSld>
     <p:spTree>
@@ -3893,7 +4120,7 @@
         </p:nvSpPr>
         <p:spPr>
           <a:xfrm>
-            <a:off x="828962" y="0"/>
+            <a:off x="778077" y="479562"/>
             <a:ext cx="10515600" cy="794602"/>
           </a:xfrm>
         </p:spPr>
@@ -3940,8 +4167,8 @@
         </p:nvSpPr>
         <p:spPr>
           <a:xfrm>
-            <a:off x="461393" y="1274164"/>
-            <a:ext cx="11148969" cy="5583836"/>
+            <a:off x="461393" y="1618938"/>
+            <a:ext cx="11148969" cy="5239062"/>
           </a:xfrm>
         </p:spPr>
         <p:txBody>
@@ -3984,7 +4211,7 @@
           <a:p>
             <a:r>
               <a:rPr lang="en-US" dirty="0"/>
-              <a:t>Requires asynchronous data movement within </a:t>
+              <a:t>Needs asynchronous data movement within </a:t>
             </a:r>
             <a:r>
               <a:rPr lang="en-US" dirty="0" err="1"/>
@@ -3992,7 +4219,7 @@
             </a:r>
             <a:r>
               <a:rPr lang="en-US" dirty="0"/>
-              <a:t>.</a:t>
+              <a:t> for reduction result.</a:t>
             </a:r>
           </a:p>
           <a:p>
@@ -4006,7 +4233,7 @@
             </a:r>
             <a:r>
               <a:rPr lang="en-US" dirty="0"/>
-              <a:t>::Future object to store the reduction result (C++11 futures do not provide needed features).  </a:t>
+              <a:t>::future object to store the reduction result (C++11 futures do not provide needed features).  </a:t>
             </a:r>
           </a:p>
           <a:p>

</xml_diff>